<commit_message>
Resolviendo problemas correccion de datos
</commit_message>
<xml_diff>
--- a/DataCorrection.pptx
+++ b/DataCorrection.pptx
@@ -156,7 +156,7 @@
           </a:lstStyle>
           <a:p>
             <a:r>
-              <a:rPr lang="es-ES" smtClean="0"/>
+              <a:rPr lang="es-ES"/>
               <a:t>Haga clic para modificar el estilo de título del patrón</a:t>
             </a:r>
             <a:endParaRPr lang="es-CO"/>
@@ -221,7 +221,7 @@
           </a:lstStyle>
           <a:p>
             <a:r>
-              <a:rPr lang="es-ES" smtClean="0"/>
+              <a:rPr lang="es-ES"/>
               <a:t>Haga clic para modificar el estilo de subtítulo del patrón</a:t>
             </a:r>
             <a:endParaRPr lang="es-CO"/>
@@ -245,7 +245,7 @@
           <a:p>
             <a:fld id="{03845D55-0257-4175-BC16-2AC88235CC02}" type="datetimeFigureOut">
               <a:rPr lang="es-CO" smtClean="0"/>
-              <a:t>12/02/2020</a:t>
+              <a:t>12/02/20</a:t>
             </a:fld>
             <a:endParaRPr lang="es-CO"/>
           </a:p>
@@ -287,7 +287,7 @@
           <a:p>
             <a:fld id="{604B6DFE-F8FB-4E1F-9C3C-407EF7CE5360}" type="slidenum">
               <a:rPr lang="es-CO" smtClean="0"/>
-              <a:t>‹Nº›</a:t>
+              <a:t>‹#›</a:t>
             </a:fld>
             <a:endParaRPr lang="es-CO"/>
           </a:p>
@@ -339,7 +339,7 @@
           <a:lstStyle/>
           <a:p>
             <a:r>
-              <a:rPr lang="es-ES" smtClean="0"/>
+              <a:rPr lang="es-ES"/>
               <a:t>Haga clic para modificar el estilo de título del patrón</a:t>
             </a:r>
             <a:endParaRPr lang="es-CO"/>
@@ -363,35 +363,35 @@
           <a:p>
             <a:pPr lvl="0"/>
             <a:r>
-              <a:rPr lang="es-ES" smtClean="0"/>
+              <a:rPr lang="es-ES"/>
               <a:t>Haga clic para modificar el estilo de texto del patrón</a:t>
             </a:r>
           </a:p>
           <a:p>
             <a:pPr lvl="1"/>
             <a:r>
-              <a:rPr lang="es-ES" smtClean="0"/>
+              <a:rPr lang="es-ES"/>
               <a:t>Segundo nivel</a:t>
             </a:r>
           </a:p>
           <a:p>
             <a:pPr lvl="2"/>
             <a:r>
-              <a:rPr lang="es-ES" smtClean="0"/>
+              <a:rPr lang="es-ES"/>
               <a:t>Tercer nivel</a:t>
             </a:r>
           </a:p>
           <a:p>
             <a:pPr lvl="3"/>
             <a:r>
-              <a:rPr lang="es-ES" smtClean="0"/>
+              <a:rPr lang="es-ES"/>
               <a:t>Cuarto nivel</a:t>
             </a:r>
           </a:p>
           <a:p>
             <a:pPr lvl="4"/>
             <a:r>
-              <a:rPr lang="es-ES" smtClean="0"/>
+              <a:rPr lang="es-ES"/>
               <a:t>Quinto nivel</a:t>
             </a:r>
             <a:endParaRPr lang="es-CO"/>
@@ -415,7 +415,7 @@
           <a:p>
             <a:fld id="{03845D55-0257-4175-BC16-2AC88235CC02}" type="datetimeFigureOut">
               <a:rPr lang="es-CO" smtClean="0"/>
-              <a:t>12/02/2020</a:t>
+              <a:t>12/02/20</a:t>
             </a:fld>
             <a:endParaRPr lang="es-CO"/>
           </a:p>
@@ -457,7 +457,7 @@
           <a:p>
             <a:fld id="{604B6DFE-F8FB-4E1F-9C3C-407EF7CE5360}" type="slidenum">
               <a:rPr lang="es-CO" smtClean="0"/>
-              <a:t>‹Nº›</a:t>
+              <a:t>‹#›</a:t>
             </a:fld>
             <a:endParaRPr lang="es-CO"/>
           </a:p>
@@ -514,7 +514,7 @@
           <a:lstStyle/>
           <a:p>
             <a:r>
-              <a:rPr lang="es-ES" smtClean="0"/>
+              <a:rPr lang="es-ES"/>
               <a:t>Haga clic para modificar el estilo de título del patrón</a:t>
             </a:r>
             <a:endParaRPr lang="es-CO"/>
@@ -543,35 +543,35 @@
           <a:p>
             <a:pPr lvl="0"/>
             <a:r>
-              <a:rPr lang="es-ES" smtClean="0"/>
+              <a:rPr lang="es-ES"/>
               <a:t>Haga clic para modificar el estilo de texto del patrón</a:t>
             </a:r>
           </a:p>
           <a:p>
             <a:pPr lvl="1"/>
             <a:r>
-              <a:rPr lang="es-ES" smtClean="0"/>
+              <a:rPr lang="es-ES"/>
               <a:t>Segundo nivel</a:t>
             </a:r>
           </a:p>
           <a:p>
             <a:pPr lvl="2"/>
             <a:r>
-              <a:rPr lang="es-ES" smtClean="0"/>
+              <a:rPr lang="es-ES"/>
               <a:t>Tercer nivel</a:t>
             </a:r>
           </a:p>
           <a:p>
             <a:pPr lvl="3"/>
             <a:r>
-              <a:rPr lang="es-ES" smtClean="0"/>
+              <a:rPr lang="es-ES"/>
               <a:t>Cuarto nivel</a:t>
             </a:r>
           </a:p>
           <a:p>
             <a:pPr lvl="4"/>
             <a:r>
-              <a:rPr lang="es-ES" smtClean="0"/>
+              <a:rPr lang="es-ES"/>
               <a:t>Quinto nivel</a:t>
             </a:r>
             <a:endParaRPr lang="es-CO"/>
@@ -595,7 +595,7 @@
           <a:p>
             <a:fld id="{03845D55-0257-4175-BC16-2AC88235CC02}" type="datetimeFigureOut">
               <a:rPr lang="es-CO" smtClean="0"/>
-              <a:t>12/02/2020</a:t>
+              <a:t>12/02/20</a:t>
             </a:fld>
             <a:endParaRPr lang="es-CO"/>
           </a:p>
@@ -637,7 +637,7 @@
           <a:p>
             <a:fld id="{604B6DFE-F8FB-4E1F-9C3C-407EF7CE5360}" type="slidenum">
               <a:rPr lang="es-CO" smtClean="0"/>
-              <a:t>‹Nº›</a:t>
+              <a:t>‹#›</a:t>
             </a:fld>
             <a:endParaRPr lang="es-CO"/>
           </a:p>
@@ -689,7 +689,7 @@
           <a:lstStyle/>
           <a:p>
             <a:r>
-              <a:rPr lang="es-ES" smtClean="0"/>
+              <a:rPr lang="es-ES"/>
               <a:t>Haga clic para modificar el estilo de título del patrón</a:t>
             </a:r>
             <a:endParaRPr lang="es-CO"/>
@@ -713,35 +713,35 @@
           <a:p>
             <a:pPr lvl="0"/>
             <a:r>
-              <a:rPr lang="es-ES" smtClean="0"/>
+              <a:rPr lang="es-ES"/>
               <a:t>Haga clic para modificar el estilo de texto del patrón</a:t>
             </a:r>
           </a:p>
           <a:p>
             <a:pPr lvl="1"/>
             <a:r>
-              <a:rPr lang="es-ES" smtClean="0"/>
+              <a:rPr lang="es-ES"/>
               <a:t>Segundo nivel</a:t>
             </a:r>
           </a:p>
           <a:p>
             <a:pPr lvl="2"/>
             <a:r>
-              <a:rPr lang="es-ES" smtClean="0"/>
+              <a:rPr lang="es-ES"/>
               <a:t>Tercer nivel</a:t>
             </a:r>
           </a:p>
           <a:p>
             <a:pPr lvl="3"/>
             <a:r>
-              <a:rPr lang="es-ES" smtClean="0"/>
+              <a:rPr lang="es-ES"/>
               <a:t>Cuarto nivel</a:t>
             </a:r>
           </a:p>
           <a:p>
             <a:pPr lvl="4"/>
             <a:r>
-              <a:rPr lang="es-ES" smtClean="0"/>
+              <a:rPr lang="es-ES"/>
               <a:t>Quinto nivel</a:t>
             </a:r>
             <a:endParaRPr lang="es-CO"/>
@@ -765,7 +765,7 @@
           <a:p>
             <a:fld id="{03845D55-0257-4175-BC16-2AC88235CC02}" type="datetimeFigureOut">
               <a:rPr lang="es-CO" smtClean="0"/>
-              <a:t>12/02/2020</a:t>
+              <a:t>12/02/20</a:t>
             </a:fld>
             <a:endParaRPr lang="es-CO"/>
           </a:p>
@@ -807,7 +807,7 @@
           <a:p>
             <a:fld id="{604B6DFE-F8FB-4E1F-9C3C-407EF7CE5360}" type="slidenum">
               <a:rPr lang="es-CO" smtClean="0"/>
-              <a:t>‹Nº›</a:t>
+              <a:t>‹#›</a:t>
             </a:fld>
             <a:endParaRPr lang="es-CO"/>
           </a:p>
@@ -868,7 +868,7 @@
           </a:lstStyle>
           <a:p>
             <a:r>
-              <a:rPr lang="es-ES" smtClean="0"/>
+              <a:rPr lang="es-ES"/>
               <a:t>Haga clic para modificar el estilo de título del patrón</a:t>
             </a:r>
             <a:endParaRPr lang="es-CO"/>
@@ -988,7 +988,7 @@
           <a:p>
             <a:pPr lvl="0"/>
             <a:r>
-              <a:rPr lang="es-ES" smtClean="0"/>
+              <a:rPr lang="es-ES"/>
               <a:t>Haga clic para modificar el estilo de texto del patrón</a:t>
             </a:r>
           </a:p>
@@ -1011,7 +1011,7 @@
           <a:p>
             <a:fld id="{03845D55-0257-4175-BC16-2AC88235CC02}" type="datetimeFigureOut">
               <a:rPr lang="es-CO" smtClean="0"/>
-              <a:t>12/02/2020</a:t>
+              <a:t>12/02/20</a:t>
             </a:fld>
             <a:endParaRPr lang="es-CO"/>
           </a:p>
@@ -1053,7 +1053,7 @@
           <a:p>
             <a:fld id="{604B6DFE-F8FB-4E1F-9C3C-407EF7CE5360}" type="slidenum">
               <a:rPr lang="es-CO" smtClean="0"/>
-              <a:t>‹Nº›</a:t>
+              <a:t>‹#›</a:t>
             </a:fld>
             <a:endParaRPr lang="es-CO"/>
           </a:p>
@@ -1105,7 +1105,7 @@
           <a:lstStyle/>
           <a:p>
             <a:r>
-              <a:rPr lang="es-ES" smtClean="0"/>
+              <a:rPr lang="es-ES"/>
               <a:t>Haga clic para modificar el estilo de título del patrón</a:t>
             </a:r>
             <a:endParaRPr lang="es-CO"/>
@@ -1134,35 +1134,35 @@
           <a:p>
             <a:pPr lvl="0"/>
             <a:r>
-              <a:rPr lang="es-ES" smtClean="0"/>
+              <a:rPr lang="es-ES"/>
               <a:t>Haga clic para modificar el estilo de texto del patrón</a:t>
             </a:r>
           </a:p>
           <a:p>
             <a:pPr lvl="1"/>
             <a:r>
-              <a:rPr lang="es-ES" smtClean="0"/>
+              <a:rPr lang="es-ES"/>
               <a:t>Segundo nivel</a:t>
             </a:r>
           </a:p>
           <a:p>
             <a:pPr lvl="2"/>
             <a:r>
-              <a:rPr lang="es-ES" smtClean="0"/>
+              <a:rPr lang="es-ES"/>
               <a:t>Tercer nivel</a:t>
             </a:r>
           </a:p>
           <a:p>
             <a:pPr lvl="3"/>
             <a:r>
-              <a:rPr lang="es-ES" smtClean="0"/>
+              <a:rPr lang="es-ES"/>
               <a:t>Cuarto nivel</a:t>
             </a:r>
           </a:p>
           <a:p>
             <a:pPr lvl="4"/>
             <a:r>
-              <a:rPr lang="es-ES" smtClean="0"/>
+              <a:rPr lang="es-ES"/>
               <a:t>Quinto nivel</a:t>
             </a:r>
             <a:endParaRPr lang="es-CO"/>
@@ -1191,35 +1191,35 @@
           <a:p>
             <a:pPr lvl="0"/>
             <a:r>
-              <a:rPr lang="es-ES" smtClean="0"/>
+              <a:rPr lang="es-ES"/>
               <a:t>Haga clic para modificar el estilo de texto del patrón</a:t>
             </a:r>
           </a:p>
           <a:p>
             <a:pPr lvl="1"/>
             <a:r>
-              <a:rPr lang="es-ES" smtClean="0"/>
+              <a:rPr lang="es-ES"/>
               <a:t>Segundo nivel</a:t>
             </a:r>
           </a:p>
           <a:p>
             <a:pPr lvl="2"/>
             <a:r>
-              <a:rPr lang="es-ES" smtClean="0"/>
+              <a:rPr lang="es-ES"/>
               <a:t>Tercer nivel</a:t>
             </a:r>
           </a:p>
           <a:p>
             <a:pPr lvl="3"/>
             <a:r>
-              <a:rPr lang="es-ES" smtClean="0"/>
+              <a:rPr lang="es-ES"/>
               <a:t>Cuarto nivel</a:t>
             </a:r>
           </a:p>
           <a:p>
             <a:pPr lvl="4"/>
             <a:r>
-              <a:rPr lang="es-ES" smtClean="0"/>
+              <a:rPr lang="es-ES"/>
               <a:t>Quinto nivel</a:t>
             </a:r>
             <a:endParaRPr lang="es-CO"/>
@@ -1243,7 +1243,7 @@
           <a:p>
             <a:fld id="{03845D55-0257-4175-BC16-2AC88235CC02}" type="datetimeFigureOut">
               <a:rPr lang="es-CO" smtClean="0"/>
-              <a:t>12/02/2020</a:t>
+              <a:t>12/02/20</a:t>
             </a:fld>
             <a:endParaRPr lang="es-CO"/>
           </a:p>
@@ -1285,7 +1285,7 @@
           <a:p>
             <a:fld id="{604B6DFE-F8FB-4E1F-9C3C-407EF7CE5360}" type="slidenum">
               <a:rPr lang="es-CO" smtClean="0"/>
-              <a:t>‹Nº›</a:t>
+              <a:t>‹#›</a:t>
             </a:fld>
             <a:endParaRPr lang="es-CO"/>
           </a:p>
@@ -1342,7 +1342,7 @@
           <a:lstStyle/>
           <a:p>
             <a:r>
-              <a:rPr lang="es-ES" smtClean="0"/>
+              <a:rPr lang="es-ES"/>
               <a:t>Haga clic para modificar el estilo de título del patrón</a:t>
             </a:r>
             <a:endParaRPr lang="es-CO"/>
@@ -1408,7 +1408,7 @@
           <a:p>
             <a:pPr lvl="0"/>
             <a:r>
-              <a:rPr lang="es-ES" smtClean="0"/>
+              <a:rPr lang="es-ES"/>
               <a:t>Haga clic para modificar el estilo de texto del patrón</a:t>
             </a:r>
           </a:p>
@@ -1436,35 +1436,35 @@
           <a:p>
             <a:pPr lvl="0"/>
             <a:r>
-              <a:rPr lang="es-ES" smtClean="0"/>
+              <a:rPr lang="es-ES"/>
               <a:t>Haga clic para modificar el estilo de texto del patrón</a:t>
             </a:r>
           </a:p>
           <a:p>
             <a:pPr lvl="1"/>
             <a:r>
-              <a:rPr lang="es-ES" smtClean="0"/>
+              <a:rPr lang="es-ES"/>
               <a:t>Segundo nivel</a:t>
             </a:r>
           </a:p>
           <a:p>
             <a:pPr lvl="2"/>
             <a:r>
-              <a:rPr lang="es-ES" smtClean="0"/>
+              <a:rPr lang="es-ES"/>
               <a:t>Tercer nivel</a:t>
             </a:r>
           </a:p>
           <a:p>
             <a:pPr lvl="3"/>
             <a:r>
-              <a:rPr lang="es-ES" smtClean="0"/>
+              <a:rPr lang="es-ES"/>
               <a:t>Cuarto nivel</a:t>
             </a:r>
           </a:p>
           <a:p>
             <a:pPr lvl="4"/>
             <a:r>
-              <a:rPr lang="es-ES" smtClean="0"/>
+              <a:rPr lang="es-ES"/>
               <a:t>Quinto nivel</a:t>
             </a:r>
             <a:endParaRPr lang="es-CO"/>
@@ -1530,7 +1530,7 @@
           <a:p>
             <a:pPr lvl="0"/>
             <a:r>
-              <a:rPr lang="es-ES" smtClean="0"/>
+              <a:rPr lang="es-ES"/>
               <a:t>Haga clic para modificar el estilo de texto del patrón</a:t>
             </a:r>
           </a:p>
@@ -1558,35 +1558,35 @@
           <a:p>
             <a:pPr lvl="0"/>
             <a:r>
-              <a:rPr lang="es-ES" smtClean="0"/>
+              <a:rPr lang="es-ES"/>
               <a:t>Haga clic para modificar el estilo de texto del patrón</a:t>
             </a:r>
           </a:p>
           <a:p>
             <a:pPr lvl="1"/>
             <a:r>
-              <a:rPr lang="es-ES" smtClean="0"/>
+              <a:rPr lang="es-ES"/>
               <a:t>Segundo nivel</a:t>
             </a:r>
           </a:p>
           <a:p>
             <a:pPr lvl="2"/>
             <a:r>
-              <a:rPr lang="es-ES" smtClean="0"/>
+              <a:rPr lang="es-ES"/>
               <a:t>Tercer nivel</a:t>
             </a:r>
           </a:p>
           <a:p>
             <a:pPr lvl="3"/>
             <a:r>
-              <a:rPr lang="es-ES" smtClean="0"/>
+              <a:rPr lang="es-ES"/>
               <a:t>Cuarto nivel</a:t>
             </a:r>
           </a:p>
           <a:p>
             <a:pPr lvl="4"/>
             <a:r>
-              <a:rPr lang="es-ES" smtClean="0"/>
+              <a:rPr lang="es-ES"/>
               <a:t>Quinto nivel</a:t>
             </a:r>
             <a:endParaRPr lang="es-CO"/>
@@ -1610,7 +1610,7 @@
           <a:p>
             <a:fld id="{03845D55-0257-4175-BC16-2AC88235CC02}" type="datetimeFigureOut">
               <a:rPr lang="es-CO" smtClean="0"/>
-              <a:t>12/02/2020</a:t>
+              <a:t>12/02/20</a:t>
             </a:fld>
             <a:endParaRPr lang="es-CO"/>
           </a:p>
@@ -1652,7 +1652,7 @@
           <a:p>
             <a:fld id="{604B6DFE-F8FB-4E1F-9C3C-407EF7CE5360}" type="slidenum">
               <a:rPr lang="es-CO" smtClean="0"/>
-              <a:t>‹Nº›</a:t>
+              <a:t>‹#›</a:t>
             </a:fld>
             <a:endParaRPr lang="es-CO"/>
           </a:p>
@@ -1704,7 +1704,7 @@
           <a:lstStyle/>
           <a:p>
             <a:r>
-              <a:rPr lang="es-ES" smtClean="0"/>
+              <a:rPr lang="es-ES"/>
               <a:t>Haga clic para modificar el estilo de título del patrón</a:t>
             </a:r>
             <a:endParaRPr lang="es-CO"/>
@@ -1728,7 +1728,7 @@
           <a:p>
             <a:fld id="{03845D55-0257-4175-BC16-2AC88235CC02}" type="datetimeFigureOut">
               <a:rPr lang="es-CO" smtClean="0"/>
-              <a:t>12/02/2020</a:t>
+              <a:t>12/02/20</a:t>
             </a:fld>
             <a:endParaRPr lang="es-CO"/>
           </a:p>
@@ -1770,7 +1770,7 @@
           <a:p>
             <a:fld id="{604B6DFE-F8FB-4E1F-9C3C-407EF7CE5360}" type="slidenum">
               <a:rPr lang="es-CO" smtClean="0"/>
-              <a:t>‹Nº›</a:t>
+              <a:t>‹#›</a:t>
             </a:fld>
             <a:endParaRPr lang="es-CO"/>
           </a:p>
@@ -1823,7 +1823,7 @@
           <a:p>
             <a:fld id="{03845D55-0257-4175-BC16-2AC88235CC02}" type="datetimeFigureOut">
               <a:rPr lang="es-CO" smtClean="0"/>
-              <a:t>12/02/2020</a:t>
+              <a:t>12/02/20</a:t>
             </a:fld>
             <a:endParaRPr lang="es-CO"/>
           </a:p>
@@ -1865,7 +1865,7 @@
           <a:p>
             <a:fld id="{604B6DFE-F8FB-4E1F-9C3C-407EF7CE5360}" type="slidenum">
               <a:rPr lang="es-CO" smtClean="0"/>
-              <a:t>‹Nº›</a:t>
+              <a:t>‹#›</a:t>
             </a:fld>
             <a:endParaRPr lang="es-CO"/>
           </a:p>
@@ -1926,7 +1926,7 @@
           </a:lstStyle>
           <a:p>
             <a:r>
-              <a:rPr lang="es-ES" smtClean="0"/>
+              <a:rPr lang="es-ES"/>
               <a:t>Haga clic para modificar el estilo de título del patrón</a:t>
             </a:r>
             <a:endParaRPr lang="es-CO"/>
@@ -1983,35 +1983,35 @@
           <a:p>
             <a:pPr lvl="0"/>
             <a:r>
-              <a:rPr lang="es-ES" smtClean="0"/>
+              <a:rPr lang="es-ES"/>
               <a:t>Haga clic para modificar el estilo de texto del patrón</a:t>
             </a:r>
           </a:p>
           <a:p>
             <a:pPr lvl="1"/>
             <a:r>
-              <a:rPr lang="es-ES" smtClean="0"/>
+              <a:rPr lang="es-ES"/>
               <a:t>Segundo nivel</a:t>
             </a:r>
           </a:p>
           <a:p>
             <a:pPr lvl="2"/>
             <a:r>
-              <a:rPr lang="es-ES" smtClean="0"/>
+              <a:rPr lang="es-ES"/>
               <a:t>Tercer nivel</a:t>
             </a:r>
           </a:p>
           <a:p>
             <a:pPr lvl="3"/>
             <a:r>
-              <a:rPr lang="es-ES" smtClean="0"/>
+              <a:rPr lang="es-ES"/>
               <a:t>Cuarto nivel</a:t>
             </a:r>
           </a:p>
           <a:p>
             <a:pPr lvl="4"/>
             <a:r>
-              <a:rPr lang="es-ES" smtClean="0"/>
+              <a:rPr lang="es-ES"/>
               <a:t>Quinto nivel</a:t>
             </a:r>
             <a:endParaRPr lang="es-CO"/>
@@ -2077,7 +2077,7 @@
           <a:p>
             <a:pPr lvl="0"/>
             <a:r>
-              <a:rPr lang="es-ES" smtClean="0"/>
+              <a:rPr lang="es-ES"/>
               <a:t>Haga clic para modificar el estilo de texto del patrón</a:t>
             </a:r>
           </a:p>
@@ -2100,7 +2100,7 @@
           <a:p>
             <a:fld id="{03845D55-0257-4175-BC16-2AC88235CC02}" type="datetimeFigureOut">
               <a:rPr lang="es-CO" smtClean="0"/>
-              <a:t>12/02/2020</a:t>
+              <a:t>12/02/20</a:t>
             </a:fld>
             <a:endParaRPr lang="es-CO"/>
           </a:p>
@@ -2142,7 +2142,7 @@
           <a:p>
             <a:fld id="{604B6DFE-F8FB-4E1F-9C3C-407EF7CE5360}" type="slidenum">
               <a:rPr lang="es-CO" smtClean="0"/>
-              <a:t>‹Nº›</a:t>
+              <a:t>‹#›</a:t>
             </a:fld>
             <a:endParaRPr lang="es-CO"/>
           </a:p>
@@ -2203,7 +2203,7 @@
           </a:lstStyle>
           <a:p>
             <a:r>
-              <a:rPr lang="es-ES" smtClean="0"/>
+              <a:rPr lang="es-ES"/>
               <a:t>Haga clic para modificar el estilo de título del patrón</a:t>
             </a:r>
             <a:endParaRPr lang="es-CO"/>
@@ -2330,7 +2330,7 @@
           <a:p>
             <a:pPr lvl="0"/>
             <a:r>
-              <a:rPr lang="es-ES" smtClean="0"/>
+              <a:rPr lang="es-ES"/>
               <a:t>Haga clic para modificar el estilo de texto del patrón</a:t>
             </a:r>
           </a:p>
@@ -2353,7 +2353,7 @@
           <a:p>
             <a:fld id="{03845D55-0257-4175-BC16-2AC88235CC02}" type="datetimeFigureOut">
               <a:rPr lang="es-CO" smtClean="0"/>
-              <a:t>12/02/2020</a:t>
+              <a:t>12/02/20</a:t>
             </a:fld>
             <a:endParaRPr lang="es-CO"/>
           </a:p>
@@ -2395,7 +2395,7 @@
           <a:p>
             <a:fld id="{604B6DFE-F8FB-4E1F-9C3C-407EF7CE5360}" type="slidenum">
               <a:rPr lang="es-CO" smtClean="0"/>
-              <a:t>‹Nº›</a:t>
+              <a:t>‹#›</a:t>
             </a:fld>
             <a:endParaRPr lang="es-CO"/>
           </a:p>
@@ -2462,7 +2462,7 @@
           <a:lstStyle/>
           <a:p>
             <a:r>
-              <a:rPr lang="es-ES" smtClean="0"/>
+              <a:rPr lang="es-ES"/>
               <a:t>Haga clic para modificar el estilo de título del patrón</a:t>
             </a:r>
             <a:endParaRPr lang="es-CO"/>
@@ -2496,35 +2496,35 @@
           <a:p>
             <a:pPr lvl="0"/>
             <a:r>
-              <a:rPr lang="es-ES" smtClean="0"/>
+              <a:rPr lang="es-ES"/>
               <a:t>Haga clic para modificar el estilo de texto del patrón</a:t>
             </a:r>
           </a:p>
           <a:p>
             <a:pPr lvl="1"/>
             <a:r>
-              <a:rPr lang="es-ES" smtClean="0"/>
+              <a:rPr lang="es-ES"/>
               <a:t>Segundo nivel</a:t>
             </a:r>
           </a:p>
           <a:p>
             <a:pPr lvl="2"/>
             <a:r>
-              <a:rPr lang="es-ES" smtClean="0"/>
+              <a:rPr lang="es-ES"/>
               <a:t>Tercer nivel</a:t>
             </a:r>
           </a:p>
           <a:p>
             <a:pPr lvl="3"/>
             <a:r>
-              <a:rPr lang="es-ES" smtClean="0"/>
+              <a:rPr lang="es-ES"/>
               <a:t>Cuarto nivel</a:t>
             </a:r>
           </a:p>
           <a:p>
             <a:pPr lvl="4"/>
             <a:r>
-              <a:rPr lang="es-ES" smtClean="0"/>
+              <a:rPr lang="es-ES"/>
               <a:t>Quinto nivel</a:t>
             </a:r>
             <a:endParaRPr lang="es-CO"/>
@@ -2566,7 +2566,7 @@
           <a:p>
             <a:fld id="{03845D55-0257-4175-BC16-2AC88235CC02}" type="datetimeFigureOut">
               <a:rPr lang="es-CO" smtClean="0"/>
-              <a:t>12/02/2020</a:t>
+              <a:t>12/02/20</a:t>
             </a:fld>
             <a:endParaRPr lang="es-CO"/>
           </a:p>
@@ -2644,7 +2644,7 @@
           <a:p>
             <a:fld id="{604B6DFE-F8FB-4E1F-9C3C-407EF7CE5360}" type="slidenum">
               <a:rPr lang="es-CO" smtClean="0"/>
-              <a:t>‹Nº›</a:t>
+              <a:t>‹#›</a:t>
             </a:fld>
             <a:endParaRPr lang="es-CO"/>
           </a:p>
@@ -2987,31 +2987,42 @@
           <a:lstStyle/>
           <a:p>
             <a:r>
-              <a:rPr lang="es-CO" dirty="0" smtClean="0"/>
+              <a:rPr lang="es-CO" dirty="0"/>
               <a:t>Sin correcciones</a:t>
             </a:r>
-            <a:endParaRPr lang="es-CO" dirty="0"/>
           </a:p>
         </p:txBody>
       </p:sp>
       <p:pic>
         <p:nvPicPr>
-          <p:cNvPr id="4" name="Imagen 3"/>
+          <p:cNvPr id="5" name="Picture 4">
+            <a:extLst>
+              <a:ext uri="{FF2B5EF4-FFF2-40B4-BE49-F238E27FC236}">
+                <a16:creationId xmlns:a16="http://schemas.microsoft.com/office/drawing/2014/main" id="{A92A9407-3AF8-9E41-9404-9385AE7B02D7}"/>
+              </a:ext>
+            </a:extLst>
+          </p:cNvPr>
           <p:cNvPicPr>
             <a:picLocks noChangeAspect="1"/>
           </p:cNvPicPr>
           <p:nvPr/>
         </p:nvPicPr>
         <p:blipFill>
-          <a:blip r:embed="rId2"/>
+          <a:blip r:embed="rId2">
+            <a:extLst>
+              <a:ext uri="{28A0092B-C50C-407E-A947-70E740481C1C}">
+                <a14:useLocalDpi xmlns:a14="http://schemas.microsoft.com/office/drawing/2010/main" val="0"/>
+              </a:ext>
+            </a:extLst>
+          </a:blip>
           <a:stretch>
             <a:fillRect/>
           </a:stretch>
         </p:blipFill>
         <p:spPr>
           <a:xfrm>
-            <a:off x="1724571" y="1591333"/>
-            <a:ext cx="8742857" cy="5266667"/>
+            <a:off x="1651000" y="1690688"/>
+            <a:ext cx="8890000" cy="5080000"/>
           </a:xfrm>
           <a:prstGeom prst="rect">
             <a:avLst/>
@@ -3064,31 +3075,42 @@
           <a:lstStyle/>
           <a:p>
             <a:r>
-              <a:rPr lang="es-CO" dirty="0" smtClean="0"/>
+              <a:rPr lang="es-CO" dirty="0"/>
               <a:t>Con corrección de puntajes</a:t>
             </a:r>
-            <a:endParaRPr lang="es-CO" dirty="0"/>
           </a:p>
         </p:txBody>
       </p:sp>
       <p:pic>
         <p:nvPicPr>
-          <p:cNvPr id="5" name="Imagen 4"/>
+          <p:cNvPr id="4" name="Picture 3">
+            <a:extLst>
+              <a:ext uri="{FF2B5EF4-FFF2-40B4-BE49-F238E27FC236}">
+                <a16:creationId xmlns:a16="http://schemas.microsoft.com/office/drawing/2014/main" id="{AC824893-0F70-994A-A431-8A6CAE87C119}"/>
+              </a:ext>
+            </a:extLst>
+          </p:cNvPr>
           <p:cNvPicPr>
             <a:picLocks noChangeAspect="1"/>
           </p:cNvPicPr>
           <p:nvPr/>
         </p:nvPicPr>
         <p:blipFill>
-          <a:blip r:embed="rId2"/>
+          <a:blip r:embed="rId2">
+            <a:extLst>
+              <a:ext uri="{28A0092B-C50C-407E-A947-70E740481C1C}">
+                <a14:useLocalDpi xmlns:a14="http://schemas.microsoft.com/office/drawing/2010/main" val="0"/>
+              </a:ext>
+            </a:extLst>
+          </a:blip>
           <a:stretch>
             <a:fillRect/>
           </a:stretch>
         </p:blipFill>
         <p:spPr>
           <a:xfrm>
-            <a:off x="1724571" y="1591333"/>
-            <a:ext cx="8742857" cy="5266667"/>
+            <a:off x="1651000" y="1690688"/>
+            <a:ext cx="8890000" cy="5080000"/>
           </a:xfrm>
           <a:prstGeom prst="rect">
             <a:avLst/>
@@ -3141,31 +3163,42 @@
           <a:lstStyle/>
           <a:p>
             <a:r>
-              <a:rPr lang="es-CO" dirty="0" smtClean="0"/>
+              <a:rPr lang="es-CO" dirty="0"/>
               <a:t>Con corrección de puntajes y estimación de bloques de unicornio presente</a:t>
             </a:r>
-            <a:endParaRPr lang="es-CO" dirty="0"/>
           </a:p>
         </p:txBody>
       </p:sp>
       <p:pic>
         <p:nvPicPr>
-          <p:cNvPr id="4" name="Imagen 3"/>
+          <p:cNvPr id="9" name="Picture 8">
+            <a:extLst>
+              <a:ext uri="{FF2B5EF4-FFF2-40B4-BE49-F238E27FC236}">
+                <a16:creationId xmlns:a16="http://schemas.microsoft.com/office/drawing/2014/main" id="{BC6CB95F-DB54-A34F-A73A-00C3CBE114BA}"/>
+              </a:ext>
+            </a:extLst>
+          </p:cNvPr>
           <p:cNvPicPr>
             <a:picLocks noChangeAspect="1"/>
           </p:cNvPicPr>
           <p:nvPr/>
         </p:nvPicPr>
         <p:blipFill>
-          <a:blip r:embed="rId2"/>
+          <a:blip r:embed="rId2">
+            <a:extLst>
+              <a:ext uri="{28A0092B-C50C-407E-A947-70E740481C1C}">
+                <a14:useLocalDpi xmlns:a14="http://schemas.microsoft.com/office/drawing/2010/main" val="0"/>
+              </a:ext>
+            </a:extLst>
+          </a:blip>
           <a:stretch>
             <a:fillRect/>
           </a:stretch>
         </p:blipFill>
         <p:spPr>
           <a:xfrm>
-            <a:off x="1724571" y="1591333"/>
-            <a:ext cx="8742857" cy="5266667"/>
+            <a:off x="1651000" y="1690688"/>
+            <a:ext cx="8890000" cy="5080000"/>
           </a:xfrm>
           <a:prstGeom prst="rect">
             <a:avLst/>

</xml_diff>

<commit_message>
Data correction for WSLS ready
</commit_message>
<xml_diff>
--- a/DataCorrection.pptx
+++ b/DataCorrection.pptx
@@ -246,7 +246,7 @@
           <a:p>
             <a:fld id="{03845D55-0257-4175-BC16-2AC88235CC02}" type="datetimeFigureOut">
               <a:rPr lang="es-CO" smtClean="0"/>
-              <a:t>13/02/2020</a:t>
+              <a:t>19/02/20</a:t>
             </a:fld>
             <a:endParaRPr lang="es-CO"/>
           </a:p>
@@ -288,7 +288,7 @@
           <a:p>
             <a:fld id="{604B6DFE-F8FB-4E1F-9C3C-407EF7CE5360}" type="slidenum">
               <a:rPr lang="es-CO" smtClean="0"/>
-              <a:t>‹Nº›</a:t>
+              <a:t>‹#›</a:t>
             </a:fld>
             <a:endParaRPr lang="es-CO"/>
           </a:p>
@@ -416,7 +416,7 @@
           <a:p>
             <a:fld id="{03845D55-0257-4175-BC16-2AC88235CC02}" type="datetimeFigureOut">
               <a:rPr lang="es-CO" smtClean="0"/>
-              <a:t>13/02/2020</a:t>
+              <a:t>19/02/20</a:t>
             </a:fld>
             <a:endParaRPr lang="es-CO"/>
           </a:p>
@@ -458,7 +458,7 @@
           <a:p>
             <a:fld id="{604B6DFE-F8FB-4E1F-9C3C-407EF7CE5360}" type="slidenum">
               <a:rPr lang="es-CO" smtClean="0"/>
-              <a:t>‹Nº›</a:t>
+              <a:t>‹#›</a:t>
             </a:fld>
             <a:endParaRPr lang="es-CO"/>
           </a:p>
@@ -596,7 +596,7 @@
           <a:p>
             <a:fld id="{03845D55-0257-4175-BC16-2AC88235CC02}" type="datetimeFigureOut">
               <a:rPr lang="es-CO" smtClean="0"/>
-              <a:t>13/02/2020</a:t>
+              <a:t>19/02/20</a:t>
             </a:fld>
             <a:endParaRPr lang="es-CO"/>
           </a:p>
@@ -638,7 +638,7 @@
           <a:p>
             <a:fld id="{604B6DFE-F8FB-4E1F-9C3C-407EF7CE5360}" type="slidenum">
               <a:rPr lang="es-CO" smtClean="0"/>
-              <a:t>‹Nº›</a:t>
+              <a:t>‹#›</a:t>
             </a:fld>
             <a:endParaRPr lang="es-CO"/>
           </a:p>
@@ -766,7 +766,7 @@
           <a:p>
             <a:fld id="{03845D55-0257-4175-BC16-2AC88235CC02}" type="datetimeFigureOut">
               <a:rPr lang="es-CO" smtClean="0"/>
-              <a:t>13/02/2020</a:t>
+              <a:t>19/02/20</a:t>
             </a:fld>
             <a:endParaRPr lang="es-CO"/>
           </a:p>
@@ -808,7 +808,7 @@
           <a:p>
             <a:fld id="{604B6DFE-F8FB-4E1F-9C3C-407EF7CE5360}" type="slidenum">
               <a:rPr lang="es-CO" smtClean="0"/>
-              <a:t>‹Nº›</a:t>
+              <a:t>‹#›</a:t>
             </a:fld>
             <a:endParaRPr lang="es-CO"/>
           </a:p>
@@ -1012,7 +1012,7 @@
           <a:p>
             <a:fld id="{03845D55-0257-4175-BC16-2AC88235CC02}" type="datetimeFigureOut">
               <a:rPr lang="es-CO" smtClean="0"/>
-              <a:t>13/02/2020</a:t>
+              <a:t>19/02/20</a:t>
             </a:fld>
             <a:endParaRPr lang="es-CO"/>
           </a:p>
@@ -1054,7 +1054,7 @@
           <a:p>
             <a:fld id="{604B6DFE-F8FB-4E1F-9C3C-407EF7CE5360}" type="slidenum">
               <a:rPr lang="es-CO" smtClean="0"/>
-              <a:t>‹Nº›</a:t>
+              <a:t>‹#›</a:t>
             </a:fld>
             <a:endParaRPr lang="es-CO"/>
           </a:p>
@@ -1244,7 +1244,7 @@
           <a:p>
             <a:fld id="{03845D55-0257-4175-BC16-2AC88235CC02}" type="datetimeFigureOut">
               <a:rPr lang="es-CO" smtClean="0"/>
-              <a:t>13/02/2020</a:t>
+              <a:t>19/02/20</a:t>
             </a:fld>
             <a:endParaRPr lang="es-CO"/>
           </a:p>
@@ -1286,7 +1286,7 @@
           <a:p>
             <a:fld id="{604B6DFE-F8FB-4E1F-9C3C-407EF7CE5360}" type="slidenum">
               <a:rPr lang="es-CO" smtClean="0"/>
-              <a:t>‹Nº›</a:t>
+              <a:t>‹#›</a:t>
             </a:fld>
             <a:endParaRPr lang="es-CO"/>
           </a:p>
@@ -1611,7 +1611,7 @@
           <a:p>
             <a:fld id="{03845D55-0257-4175-BC16-2AC88235CC02}" type="datetimeFigureOut">
               <a:rPr lang="es-CO" smtClean="0"/>
-              <a:t>13/02/2020</a:t>
+              <a:t>19/02/20</a:t>
             </a:fld>
             <a:endParaRPr lang="es-CO"/>
           </a:p>
@@ -1653,7 +1653,7 @@
           <a:p>
             <a:fld id="{604B6DFE-F8FB-4E1F-9C3C-407EF7CE5360}" type="slidenum">
               <a:rPr lang="es-CO" smtClean="0"/>
-              <a:t>‹Nº›</a:t>
+              <a:t>‹#›</a:t>
             </a:fld>
             <a:endParaRPr lang="es-CO"/>
           </a:p>
@@ -1729,7 +1729,7 @@
           <a:p>
             <a:fld id="{03845D55-0257-4175-BC16-2AC88235CC02}" type="datetimeFigureOut">
               <a:rPr lang="es-CO" smtClean="0"/>
-              <a:t>13/02/2020</a:t>
+              <a:t>19/02/20</a:t>
             </a:fld>
             <a:endParaRPr lang="es-CO"/>
           </a:p>
@@ -1771,7 +1771,7 @@
           <a:p>
             <a:fld id="{604B6DFE-F8FB-4E1F-9C3C-407EF7CE5360}" type="slidenum">
               <a:rPr lang="es-CO" smtClean="0"/>
-              <a:t>‹Nº›</a:t>
+              <a:t>‹#›</a:t>
             </a:fld>
             <a:endParaRPr lang="es-CO"/>
           </a:p>
@@ -1824,7 +1824,7 @@
           <a:p>
             <a:fld id="{03845D55-0257-4175-BC16-2AC88235CC02}" type="datetimeFigureOut">
               <a:rPr lang="es-CO" smtClean="0"/>
-              <a:t>13/02/2020</a:t>
+              <a:t>19/02/20</a:t>
             </a:fld>
             <a:endParaRPr lang="es-CO"/>
           </a:p>
@@ -1866,7 +1866,7 @@
           <a:p>
             <a:fld id="{604B6DFE-F8FB-4E1F-9C3C-407EF7CE5360}" type="slidenum">
               <a:rPr lang="es-CO" smtClean="0"/>
-              <a:t>‹Nº›</a:t>
+              <a:t>‹#›</a:t>
             </a:fld>
             <a:endParaRPr lang="es-CO"/>
           </a:p>
@@ -2101,7 +2101,7 @@
           <a:p>
             <a:fld id="{03845D55-0257-4175-BC16-2AC88235CC02}" type="datetimeFigureOut">
               <a:rPr lang="es-CO" smtClean="0"/>
-              <a:t>13/02/2020</a:t>
+              <a:t>19/02/20</a:t>
             </a:fld>
             <a:endParaRPr lang="es-CO"/>
           </a:p>
@@ -2143,7 +2143,7 @@
           <a:p>
             <a:fld id="{604B6DFE-F8FB-4E1F-9C3C-407EF7CE5360}" type="slidenum">
               <a:rPr lang="es-CO" smtClean="0"/>
-              <a:t>‹Nº›</a:t>
+              <a:t>‹#›</a:t>
             </a:fld>
             <a:endParaRPr lang="es-CO"/>
           </a:p>
@@ -2354,7 +2354,7 @@
           <a:p>
             <a:fld id="{03845D55-0257-4175-BC16-2AC88235CC02}" type="datetimeFigureOut">
               <a:rPr lang="es-CO" smtClean="0"/>
-              <a:t>13/02/2020</a:t>
+              <a:t>19/02/20</a:t>
             </a:fld>
             <a:endParaRPr lang="es-CO"/>
           </a:p>
@@ -2396,7 +2396,7 @@
           <a:p>
             <a:fld id="{604B6DFE-F8FB-4E1F-9C3C-407EF7CE5360}" type="slidenum">
               <a:rPr lang="es-CO" smtClean="0"/>
-              <a:t>‹Nº›</a:t>
+              <a:t>‹#›</a:t>
             </a:fld>
             <a:endParaRPr lang="es-CO"/>
           </a:p>
@@ -2567,7 +2567,7 @@
           <a:p>
             <a:fld id="{03845D55-0257-4175-BC16-2AC88235CC02}" type="datetimeFigureOut">
               <a:rPr lang="es-CO" smtClean="0"/>
-              <a:t>13/02/2020</a:t>
+              <a:t>19/02/20</a:t>
             </a:fld>
             <a:endParaRPr lang="es-CO"/>
           </a:p>
@@ -2645,7 +2645,7 @@
           <a:p>
             <a:fld id="{604B6DFE-F8FB-4E1F-9C3C-407EF7CE5360}" type="slidenum">
               <a:rPr lang="es-CO" smtClean="0"/>
-              <a:t>‹Nº›</a:t>
+              <a:t>‹#›</a:t>
             </a:fld>
             <a:endParaRPr lang="es-CO"/>
           </a:p>
@@ -2996,7 +2996,13 @@
       </p:sp>
       <p:pic>
         <p:nvPicPr>
-          <p:cNvPr id="4" name="Imagen 3"/>
+          <p:cNvPr id="6" name="Picture 5">
+            <a:extLst>
+              <a:ext uri="{FF2B5EF4-FFF2-40B4-BE49-F238E27FC236}">
+                <a16:creationId xmlns:a16="http://schemas.microsoft.com/office/drawing/2014/main" id="{52D98996-E756-104E-881E-B1E0FF1D77D8}"/>
+              </a:ext>
+            </a:extLst>
+          </p:cNvPr>
           <p:cNvPicPr>
             <a:picLocks noChangeAspect="1"/>
           </p:cNvPicPr>
@@ -3010,8 +3016,8 @@
         </p:blipFill>
         <p:spPr>
           <a:xfrm>
-            <a:off x="1724571" y="1591333"/>
-            <a:ext cx="8742857" cy="5266667"/>
+            <a:off x="1651000" y="1690688"/>
+            <a:ext cx="8890000" cy="3873500"/>
           </a:xfrm>
           <a:prstGeom prst="rect">
             <a:avLst/>
@@ -3053,7 +3059,7 @@
           <p:cNvPr id="2" name="Title 1">
             <a:extLst>
               <a:ext uri="{FF2B5EF4-FFF2-40B4-BE49-F238E27FC236}">
-                <a16:creationId xmlns:a16="http://schemas.microsoft.com/office/drawing/2014/main" xmlns="" id="{D232E6B4-C860-6E4B-A678-30C4A534D1CE}"/>
+                <a16:creationId xmlns:a16="http://schemas.microsoft.com/office/drawing/2014/main" id="{D232E6B4-C860-6E4B-A678-30C4A534D1CE}"/>
               </a:ext>
             </a:extLst>
           </p:cNvPr>
@@ -3086,7 +3092,13 @@
       </p:sp>
       <p:pic>
         <p:nvPicPr>
-          <p:cNvPr id="4" name="Imagen 3"/>
+          <p:cNvPr id="6" name="Picture 5">
+            <a:extLst>
+              <a:ext uri="{FF2B5EF4-FFF2-40B4-BE49-F238E27FC236}">
+                <a16:creationId xmlns:a16="http://schemas.microsoft.com/office/drawing/2014/main" id="{CE728242-09A0-6643-BDC2-CF4E583AB9C7}"/>
+              </a:ext>
+            </a:extLst>
+          </p:cNvPr>
           <p:cNvPicPr>
             <a:picLocks noChangeAspect="1"/>
           </p:cNvPicPr>
@@ -3100,8 +3112,8 @@
         </p:blipFill>
         <p:spPr>
           <a:xfrm>
-            <a:off x="1724571" y="1591333"/>
-            <a:ext cx="8742857" cy="5266667"/>
+            <a:off x="1651000" y="1690688"/>
+            <a:ext cx="8890000" cy="3873500"/>
           </a:xfrm>
           <a:prstGeom prst="rect">
             <a:avLst/>
@@ -3162,7 +3174,13 @@
       </p:sp>
       <p:pic>
         <p:nvPicPr>
-          <p:cNvPr id="4" name="Imagen 3"/>
+          <p:cNvPr id="5" name="Picture 4">
+            <a:extLst>
+              <a:ext uri="{FF2B5EF4-FFF2-40B4-BE49-F238E27FC236}">
+                <a16:creationId xmlns:a16="http://schemas.microsoft.com/office/drawing/2014/main" id="{76D4D1C5-FB3C-EB40-A2E3-2AFBE813431F}"/>
+              </a:ext>
+            </a:extLst>
+          </p:cNvPr>
           <p:cNvPicPr>
             <a:picLocks noChangeAspect="1"/>
           </p:cNvPicPr>
@@ -3176,8 +3194,8 @@
         </p:blipFill>
         <p:spPr>
           <a:xfrm>
-            <a:off x="1724571" y="1591333"/>
-            <a:ext cx="8742857" cy="5266667"/>
+            <a:off x="1651000" y="1690688"/>
+            <a:ext cx="8890000" cy="3873500"/>
           </a:xfrm>
           <a:prstGeom prst="rect">
             <a:avLst/>
@@ -3238,7 +3256,13 @@
       </p:sp>
       <p:pic>
         <p:nvPicPr>
-          <p:cNvPr id="3" name="Imagen 2"/>
+          <p:cNvPr id="5" name="Picture 4">
+            <a:extLst>
+              <a:ext uri="{FF2B5EF4-FFF2-40B4-BE49-F238E27FC236}">
+                <a16:creationId xmlns:a16="http://schemas.microsoft.com/office/drawing/2014/main" id="{A7BCDFA1-AC2A-3D48-BC38-21FEB66CB100}"/>
+              </a:ext>
+            </a:extLst>
+          </p:cNvPr>
           <p:cNvPicPr>
             <a:picLocks noChangeAspect="1"/>
           </p:cNvPicPr>
@@ -3252,8 +3276,8 @@
         </p:blipFill>
         <p:spPr>
           <a:xfrm>
-            <a:off x="1724571" y="1591333"/>
-            <a:ext cx="8742857" cy="5266667"/>
+            <a:off x="1651000" y="1690688"/>
+            <a:ext cx="8890000" cy="3873500"/>
           </a:xfrm>
           <a:prstGeom prst="rect">
             <a:avLst/>

</xml_diff>